<commit_message>
Atualiza aula 02 bd
</commit_message>
<xml_diff>
--- a/sprint-1-bd/aulas/Aula_02_BD.pptx
+++ b/sprint-1-bd/aulas/Aula_02_BD.pptx
@@ -5346,8 +5346,19 @@
                 <a:latin typeface="Arial" panose="020B0604020202020204" pitchFamily="34" charset="0"/>
                 <a:cs typeface="Arial" panose="020B0604020202020204" pitchFamily="34" charset="0"/>
               </a:rPr>
-              <a:t>Foi criado em parceria entre Microsoft e a Sybase, em 1998.</a:t>
-            </a:r>
+              <a:t>Foi criado em parceria entre Microsoft e a Sybase, </a:t>
+            </a:r>
+            <a:r>
+              <a:rPr lang="pt-BR" sz="2000">
+                <a:latin typeface="Arial" panose="020B0604020202020204" pitchFamily="34" charset="0"/>
+                <a:cs typeface="Arial" panose="020B0604020202020204" pitchFamily="34" charset="0"/>
+              </a:rPr>
+              <a:t>em 1984.</a:t>
+            </a:r>
+            <a:endParaRPr lang="pt-BR" sz="2000" dirty="0">
+              <a:latin typeface="Arial" panose="020B0604020202020204" pitchFamily="34" charset="0"/>
+              <a:cs typeface="Arial" panose="020B0604020202020204" pitchFamily="34" charset="0"/>
+            </a:endParaRPr>
           </a:p>
           <a:p>
             <a:pPr algn="just"/>
@@ -7317,18 +7328,18 @@
 </file>
 
 <file path=customXml/item2.xml><?xml version="1.0" encoding="utf-8"?>
+<p:properties xmlns:p="http://schemas.microsoft.com/office/2006/metadata/properties" xmlns:xsi="http://www.w3.org/2001/XMLSchema-instance" xmlns:pc="http://schemas.microsoft.com/office/infopath/2007/PartnerControls">
+  <documentManagement/>
+</p:properties>
+</file>
+
+<file path=customXml/item3.xml><?xml version="1.0" encoding="utf-8"?>
 <?mso-contentType ?>
 <FormTemplates xmlns="http://schemas.microsoft.com/sharepoint/v3/contenttype/forms">
   <Display>DocumentLibraryForm</Display>
   <Edit>DocumentLibraryForm</Edit>
   <New>DocumentLibraryForm</New>
 </FormTemplates>
-</file>
-
-<file path=customXml/item3.xml><?xml version="1.0" encoding="utf-8"?>
-<p:properties xmlns:p="http://schemas.microsoft.com/office/2006/metadata/properties" xmlns:xsi="http://www.w3.org/2001/XMLSchema-instance" xmlns:pc="http://schemas.microsoft.com/office/infopath/2007/PartnerControls">
-  <documentManagement/>
-</p:properties>
 </file>
 
 <file path=customXml/itemProps1.xml><?xml version="1.0" encoding="utf-8"?>
@@ -7351,18 +7362,18 @@
 </file>
 
 <file path=customXml/itemProps2.xml><?xml version="1.0" encoding="utf-8"?>
-<ds:datastoreItem xmlns:ds="http://schemas.openxmlformats.org/officeDocument/2006/customXml" ds:itemID="{8AEFDE86-9ABD-4B53-9EB0-611E0710241D}">
-  <ds:schemaRefs>
-    <ds:schemaRef ds:uri="http://schemas.microsoft.com/sharepoint/v3/contenttype/forms"/>
-  </ds:schemaRefs>
-</ds:datastoreItem>
-</file>
-
-<file path=customXml/itemProps3.xml><?xml version="1.0" encoding="utf-8"?>
 <ds:datastoreItem xmlns:ds="http://schemas.openxmlformats.org/officeDocument/2006/customXml" ds:itemID="{7598036D-8F24-4150-8883-4040B39D685E}">
   <ds:schemaRefs>
     <ds:schemaRef ds:uri="http://schemas.microsoft.com/office/2006/metadata/properties"/>
     <ds:schemaRef ds:uri="http://schemas.microsoft.com/office/infopath/2007/PartnerControls"/>
   </ds:schemaRefs>
 </ds:datastoreItem>
+</file>
+
+<file path=customXml/itemProps3.xml><?xml version="1.0" encoding="utf-8"?>
+<ds:datastoreItem xmlns:ds="http://schemas.openxmlformats.org/officeDocument/2006/customXml" ds:itemID="{8AEFDE86-9ABD-4B53-9EB0-611E0710241D}">
+  <ds:schemaRefs>
+    <ds:schemaRef ds:uri="http://schemas.microsoft.com/sharepoint/v3/contenttype/forms"/>
+  </ds:schemaRefs>
+</ds:datastoreItem>
 </file>
</xml_diff>